<commit_message>
Added example w.r.t 20.10
</commit_message>
<xml_diff>
--- a/Examples/Data/Rendering-Printing/presentation.pptx
+++ b/Examples/Data/Rendering-Printing/presentation.pptx
@@ -1,7 +1,6 @@
 
 <file path=ppt/presentation.xml><?xml version="1.0" encoding="utf-8"?>
-<!--Generated by Aspose.Slides for .NET 19.6-->
-<p:presentation xmlns:r="http://schemas.openxmlformats.org/officeDocument/2006/relationships" xmlns:a="http://schemas.openxmlformats.org/drawingml/2006/main" xmlns:p="http://schemas.openxmlformats.org/presentationml/2006/main" saveSubsetFonts="1">
+<p:presentation xmlns:a="http://schemas.openxmlformats.org/drawingml/2006/main" xmlns:r="http://schemas.openxmlformats.org/officeDocument/2006/relationships" xmlns:p="http://schemas.openxmlformats.org/presentationml/2006/main" saveSubsetFonts="1">
   <p:sldMasterIdLst>
     <p:sldMasterId id="2147483648" r:id="rId1"/>
   </p:sldMasterIdLst>
@@ -108,11 +107,56 @@
       </a:defRPr>
     </a:lvl9pPr>
   </p:defaultTextStyle>
+  <p:extLst>
+    <p:ext uri="{EFAFB233-063F-42B5-8137-9DF3F51BA10A}">
+      <p15:sldGuideLst xmlns:p15="http://schemas.microsoft.com/office/powerpoint/2012/main"/>
+    </p:ext>
+    <p:ext uri="{2D200454-40CA-4A62-9FC3-DE9A4176ACB9}">
+      <p15:notesGuideLst xmlns:p15="http://schemas.microsoft.com/office/powerpoint/2012/main"/>
+    </p:ext>
+  </p:extLst>
 </p:presentation>
 </file>
 
+<file path=ppt/commentAuthors.xml><?xml version="1.0" encoding="utf-8"?>
+<p:cmAuthorLst xmlns:a="http://schemas.openxmlformats.org/drawingml/2006/main" xmlns:r="http://schemas.openxmlformats.org/officeDocument/2006/relationships" xmlns:p="http://schemas.openxmlformats.org/presentationml/2006/main">
+  <p:cmAuthor id="1" name="Сергей Пучок" initials="СП" lastIdx="2" clrIdx="0">
+    <p:extLst>
+      <p:ext uri="{19B8F6BF-5375-455C-9EA6-DF929625EA0E}">
+        <p15:presenceInfo xmlns:p15="http://schemas.microsoft.com/office/powerpoint/2012/main" userId="9dd025ed30fcb32e" providerId="Windows Live"/>
+      </p:ext>
+    </p:extLst>
+  </p:cmAuthor>
+</p:cmAuthorLst>
+</file>
+
+<file path=ppt/comments/comment1.xml><?xml version="1.0" encoding="utf-8"?>
+<p:cmLst xmlns:a="http://schemas.openxmlformats.org/drawingml/2006/main" xmlns:r="http://schemas.openxmlformats.org/officeDocument/2006/relationships" xmlns:p="http://schemas.openxmlformats.org/presentationml/2006/main">
+  <p:cm authorId="1" dt="2020-10-19T19:04:27.933" idx="1">
+    <p:pos x="10" y="10"/>
+    <p:text>The comment</p:text>
+    <p:extLst>
+      <p:ext uri="{C676402C-5697-4E1C-873F-D02D1690AC5C}">
+        <p15:threadingInfo xmlns:p15="http://schemas.microsoft.com/office/powerpoint/2012/main" timeZoneBias="-180"/>
+      </p:ext>
+    </p:extLst>
+  </p:cm>
+  <p:cm authorId="1" dt="2020-10-19T19:04:46.704" idx="2">
+    <p:pos x="10" y="146"/>
+    <p:text>Reply comment</p:text>
+    <p:extLst>
+      <p:ext uri="{C676402C-5697-4E1C-873F-D02D1690AC5C}">
+        <p15:threadingInfo xmlns:p15="http://schemas.microsoft.com/office/powerpoint/2012/main" timeZoneBias="-180">
+          <p15:parentCm authorId="1" idx="1"/>
+        </p15:threadingInfo>
+      </p:ext>
+    </p:extLst>
+  </p:cm>
+</p:cmLst>
+</file>
+
 <file path=ppt/slideLayouts/slideLayout1.xml><?xml version="1.0" encoding="utf-8"?>
-<p:sldLayout xmlns:a="http://schemas.openxmlformats.org/drawingml/2006/main" xmlns:r="http://schemas.openxmlformats.org/officeDocument/2006/relationships" xmlns:p14="http://schemas.microsoft.com/office/powerpoint/2010/main" xmlns:a14="http://schemas.microsoft.com/office/drawing/2010/main" xmlns:p15="http://schemas.microsoft.com/office/powerpoint/2012/main" xmlns:p159="http://schemas.microsoft.com/office/powerpoint/2015/09/main" xmlns:p="http://schemas.openxmlformats.org/presentationml/2006/main" type="title" preserve="1">
+<p:sldLayout xmlns:a="http://schemas.openxmlformats.org/drawingml/2006/main" xmlns:r="http://schemas.openxmlformats.org/officeDocument/2006/relationships" xmlns:p="http://schemas.openxmlformats.org/presentationml/2006/main" type="title" preserve="1">
   <p:cSld name="Title Slide">
     <p:spTree>
       <p:nvGrpSpPr>
@@ -124,6 +168,8 @@
         <a:xfrm>
           <a:off x="0" y="0"/>
           <a:ext cx="0" cy="0"/>
+          <a:chOff x="0" y="0"/>
+          <a:chExt cx="0" cy="0"/>
         </a:xfrm>
       </p:grpSpPr>
       <p:sp>
@@ -142,10 +188,9 @@
           <a:lstStyle/>
           <a:p>
             <a:r>
-              <a:rPr lang="en-US" smtClean="0"/>
+              <a:rPr lang="en-US"/>
               <a:t>Click to edit Master title style</a:t>
             </a:r>
-            <a:endParaRPr lang="en-US"/>
           </a:p>
         </p:txBody>
       </p:sp>
@@ -256,10 +301,9 @@
           </a:lstStyle>
           <a:p>
             <a:r>
-              <a:rPr lang="en-US" smtClean="0"/>
+              <a:rPr lang="en-US"/>
               <a:t>Click to edit Master subtitle style</a:t>
             </a:r>
-            <a:endParaRPr lang="en-US"/>
           </a:p>
         </p:txBody>
       </p:sp>
@@ -280,7 +324,7 @@
           <a:p>
             <a:fld id="{D830A975-2589-4A7F-B344-5F78372BF9E3}" type="datetimeFigureOut">
               <a:rPr lang="en-US" smtClean="0"/>
-              <a:t>11/7/2009</a:t>
+              <a:t>10/19/2020</a:t>
             </a:fld>
             <a:endParaRPr lang="en-US"/>
           </a:p>
@@ -334,12 +378,11 @@
     <a:masterClrMapping/>
   </p:clrMapOvr>
   <p:transition/>
-  <p:timing/>
 </p:sldLayout>
 </file>
 
 <file path=ppt/slideLayouts/slideLayout10.xml><?xml version="1.0" encoding="utf-8"?>
-<p:sldLayout xmlns:a="http://schemas.openxmlformats.org/drawingml/2006/main" xmlns:r="http://schemas.openxmlformats.org/officeDocument/2006/relationships" xmlns:p14="http://schemas.microsoft.com/office/powerpoint/2010/main" xmlns:a14="http://schemas.microsoft.com/office/drawing/2010/main" xmlns:p15="http://schemas.microsoft.com/office/powerpoint/2012/main" xmlns:p159="http://schemas.microsoft.com/office/powerpoint/2015/09/main" xmlns:p="http://schemas.openxmlformats.org/presentationml/2006/main" type="vertTx" preserve="1">
+<p:sldLayout xmlns:a="http://schemas.openxmlformats.org/drawingml/2006/main" xmlns:r="http://schemas.openxmlformats.org/officeDocument/2006/relationships" xmlns:p="http://schemas.openxmlformats.org/presentationml/2006/main" type="vertTx" preserve="1">
   <p:cSld name="Title and Vertical Text">
     <p:spTree>
       <p:nvGrpSpPr>
@@ -351,6 +394,8 @@
         <a:xfrm>
           <a:off x="0" y="0"/>
           <a:ext cx="0" cy="0"/>
+          <a:chOff x="0" y="0"/>
+          <a:chExt cx="0" cy="0"/>
         </a:xfrm>
       </p:grpSpPr>
       <p:sp>
@@ -369,10 +414,9 @@
           <a:lstStyle/>
           <a:p>
             <a:r>
-              <a:rPr lang="en-US" smtClean="0"/>
+              <a:rPr lang="en-US"/>
               <a:t>Click to edit Master title style</a:t>
             </a:r>
-            <a:endParaRPr lang="en-US"/>
           </a:p>
         </p:txBody>
       </p:sp>
@@ -392,38 +436,37 @@
           <a:lstStyle/>
           <a:p>
             <a:r>
-              <a:rPr lang="en-US" smtClean="0"/>
+              <a:rPr lang="en-US"/>
               <a:t>Click to edit Master text styles</a:t>
             </a:r>
           </a:p>
           <a:p>
             <a:pPr lvl="1"/>
             <a:r>
-              <a:rPr lang="en-US" smtClean="0"/>
+              <a:rPr lang="en-US"/>
               <a:t>Second level</a:t>
             </a:r>
           </a:p>
           <a:p>
             <a:pPr lvl="2"/>
             <a:r>
-              <a:rPr lang="en-US" smtClean="0"/>
+              <a:rPr lang="en-US"/>
               <a:t>Third level</a:t>
             </a:r>
           </a:p>
           <a:p>
             <a:pPr lvl="3"/>
             <a:r>
-              <a:rPr lang="en-US" smtClean="0"/>
+              <a:rPr lang="en-US"/>
               <a:t>Fourth level</a:t>
             </a:r>
           </a:p>
           <a:p>
             <a:pPr lvl="4"/>
             <a:r>
-              <a:rPr lang="en-US" smtClean="0"/>
+              <a:rPr lang="en-US"/>
               <a:t>Fifth level</a:t>
             </a:r>
-            <a:endParaRPr lang="en-US"/>
           </a:p>
         </p:txBody>
       </p:sp>
@@ -444,7 +487,7 @@
           <a:p>
             <a:fld id="{5115AB7F-816E-4B68-A25B-3EA86C3B6241}" type="datetimeFigureOut">
               <a:rPr lang="en-US" smtClean="0"/>
-              <a:t>11/7/2009</a:t>
+              <a:t>10/19/2020</a:t>
             </a:fld>
             <a:endParaRPr lang="en-US"/>
           </a:p>
@@ -498,12 +541,11 @@
     <a:masterClrMapping/>
   </p:clrMapOvr>
   <p:transition/>
-  <p:timing/>
 </p:sldLayout>
 </file>
 
 <file path=ppt/slideLayouts/slideLayout11.xml><?xml version="1.0" encoding="utf-8"?>
-<p:sldLayout xmlns:a="http://schemas.openxmlformats.org/drawingml/2006/main" xmlns:r="http://schemas.openxmlformats.org/officeDocument/2006/relationships" xmlns:p14="http://schemas.microsoft.com/office/powerpoint/2010/main" xmlns:a14="http://schemas.microsoft.com/office/drawing/2010/main" xmlns:p15="http://schemas.microsoft.com/office/powerpoint/2012/main" xmlns:p159="http://schemas.microsoft.com/office/powerpoint/2015/09/main" xmlns:p="http://schemas.openxmlformats.org/presentationml/2006/main" type="vertTitleAndTx" preserve="1">
+<p:sldLayout xmlns:a="http://schemas.openxmlformats.org/drawingml/2006/main" xmlns:r="http://schemas.openxmlformats.org/officeDocument/2006/relationships" xmlns:p="http://schemas.openxmlformats.org/presentationml/2006/main" type="vertTitleAndTx" preserve="1">
   <p:cSld name="Vertical Title and Text">
     <p:spTree>
       <p:nvGrpSpPr>
@@ -515,6 +557,8 @@
         <a:xfrm>
           <a:off x="0" y="0"/>
           <a:ext cx="0" cy="0"/>
+          <a:chOff x="0" y="0"/>
+          <a:chExt cx="0" cy="0"/>
         </a:xfrm>
       </p:grpSpPr>
       <p:sp>
@@ -533,10 +577,9 @@
           <a:lstStyle/>
           <a:p>
             <a:r>
-              <a:rPr lang="en-US" smtClean="0"/>
+              <a:rPr lang="en-US"/>
               <a:t>Click to edit Master title style</a:t>
             </a:r>
-            <a:endParaRPr lang="en-US"/>
           </a:p>
         </p:txBody>
       </p:sp>
@@ -556,38 +599,37 @@
           <a:lstStyle/>
           <a:p>
             <a:r>
-              <a:rPr lang="en-US" smtClean="0"/>
+              <a:rPr lang="en-US"/>
               <a:t>Click to edit Master text styles</a:t>
             </a:r>
           </a:p>
           <a:p>
             <a:pPr lvl="1"/>
             <a:r>
-              <a:rPr lang="en-US" smtClean="0"/>
+              <a:rPr lang="en-US"/>
               <a:t>Second level</a:t>
             </a:r>
           </a:p>
           <a:p>
             <a:pPr lvl="2"/>
             <a:r>
-              <a:rPr lang="en-US" smtClean="0"/>
+              <a:rPr lang="en-US"/>
               <a:t>Third level</a:t>
             </a:r>
           </a:p>
           <a:p>
             <a:pPr lvl="3"/>
             <a:r>
-              <a:rPr lang="en-US" smtClean="0"/>
+              <a:rPr lang="en-US"/>
               <a:t>Fourth level</a:t>
             </a:r>
           </a:p>
           <a:p>
             <a:pPr lvl="4"/>
             <a:r>
-              <a:rPr lang="en-US" smtClean="0"/>
+              <a:rPr lang="en-US"/>
               <a:t>Fifth level</a:t>
             </a:r>
-            <a:endParaRPr lang="en-US"/>
           </a:p>
         </p:txBody>
       </p:sp>
@@ -608,7 +650,7 @@
           <a:p>
             <a:fld id="{7AD8A434-7695-4DBB-B708-82737233F6F6}" type="datetimeFigureOut">
               <a:rPr lang="en-US" smtClean="0"/>
-              <a:t>11/7/2009</a:t>
+              <a:t>10/19/2020</a:t>
             </a:fld>
             <a:endParaRPr lang="en-US"/>
           </a:p>
@@ -662,12 +704,11 @@
     <a:masterClrMapping/>
   </p:clrMapOvr>
   <p:transition/>
-  <p:timing/>
 </p:sldLayout>
 </file>
 
 <file path=ppt/slideLayouts/slideLayout2.xml><?xml version="1.0" encoding="utf-8"?>
-<p:sldLayout xmlns:a="http://schemas.openxmlformats.org/drawingml/2006/main" xmlns:r="http://schemas.openxmlformats.org/officeDocument/2006/relationships" xmlns:p14="http://schemas.microsoft.com/office/powerpoint/2010/main" xmlns:a14="http://schemas.microsoft.com/office/drawing/2010/main" xmlns:p15="http://schemas.microsoft.com/office/powerpoint/2012/main" xmlns:p159="http://schemas.microsoft.com/office/powerpoint/2015/09/main" xmlns:p="http://schemas.openxmlformats.org/presentationml/2006/main" type="obj" preserve="1">
+<p:sldLayout xmlns:a="http://schemas.openxmlformats.org/drawingml/2006/main" xmlns:r="http://schemas.openxmlformats.org/officeDocument/2006/relationships" xmlns:p="http://schemas.openxmlformats.org/presentationml/2006/main" type="obj" preserve="1">
   <p:cSld name="Title and Content">
     <p:spTree>
       <p:nvGrpSpPr>
@@ -679,6 +720,8 @@
         <a:xfrm>
           <a:off x="0" y="0"/>
           <a:ext cx="0" cy="0"/>
+          <a:chOff x="0" y="0"/>
+          <a:chExt cx="0" cy="0"/>
         </a:xfrm>
       </p:grpSpPr>
       <p:sp>
@@ -697,10 +740,9 @@
           <a:lstStyle/>
           <a:p>
             <a:r>
-              <a:rPr lang="en-US" smtClean="0"/>
+              <a:rPr lang="en-US"/>
               <a:t>Click to edit Master title style</a:t>
             </a:r>
-            <a:endParaRPr lang="en-US"/>
           </a:p>
         </p:txBody>
       </p:sp>
@@ -720,38 +762,37 @@
           <a:lstStyle/>
           <a:p>
             <a:r>
-              <a:rPr lang="en-US" smtClean="0"/>
+              <a:rPr lang="en-US"/>
               <a:t>Click to edit Master text styles</a:t>
             </a:r>
           </a:p>
           <a:p>
             <a:pPr lvl="1"/>
             <a:r>
-              <a:rPr lang="en-US" smtClean="0"/>
+              <a:rPr lang="en-US"/>
               <a:t>Second level</a:t>
             </a:r>
           </a:p>
           <a:p>
             <a:pPr lvl="2"/>
             <a:r>
-              <a:rPr lang="en-US" smtClean="0"/>
+              <a:rPr lang="en-US"/>
               <a:t>Third level</a:t>
             </a:r>
           </a:p>
           <a:p>
             <a:pPr lvl="3"/>
             <a:r>
-              <a:rPr lang="en-US" smtClean="0"/>
+              <a:rPr lang="en-US"/>
               <a:t>Fourth level</a:t>
             </a:r>
           </a:p>
           <a:p>
             <a:pPr lvl="4"/>
             <a:r>
-              <a:rPr lang="en-US" smtClean="0"/>
+              <a:rPr lang="en-US"/>
               <a:t>Fifth level</a:t>
             </a:r>
-            <a:endParaRPr lang="en-US"/>
           </a:p>
         </p:txBody>
       </p:sp>
@@ -772,7 +813,7 @@
           <a:p>
             <a:fld id="{0D5B5CF9-E8FA-44C6-B52B-9454FCADD85C}" type="datetimeFigureOut">
               <a:rPr lang="en-US" smtClean="0"/>
-              <a:t>11/7/2009</a:t>
+              <a:t>10/19/2020</a:t>
             </a:fld>
             <a:endParaRPr lang="en-US"/>
           </a:p>
@@ -826,12 +867,11 @@
     <a:masterClrMapping/>
   </p:clrMapOvr>
   <p:transition/>
-  <p:timing/>
 </p:sldLayout>
 </file>
 
 <file path=ppt/slideLayouts/slideLayout3.xml><?xml version="1.0" encoding="utf-8"?>
-<p:sldLayout xmlns:a="http://schemas.openxmlformats.org/drawingml/2006/main" xmlns:r="http://schemas.openxmlformats.org/officeDocument/2006/relationships" xmlns:p14="http://schemas.microsoft.com/office/powerpoint/2010/main" xmlns:a14="http://schemas.microsoft.com/office/drawing/2010/main" xmlns:p15="http://schemas.microsoft.com/office/powerpoint/2012/main" xmlns:p159="http://schemas.microsoft.com/office/powerpoint/2015/09/main" xmlns:p="http://schemas.openxmlformats.org/presentationml/2006/main" type="secHead" preserve="1">
+<p:sldLayout xmlns:a="http://schemas.openxmlformats.org/drawingml/2006/main" xmlns:r="http://schemas.openxmlformats.org/officeDocument/2006/relationships" xmlns:p="http://schemas.openxmlformats.org/presentationml/2006/main" type="secHead" preserve="1">
   <p:cSld name="Section Header">
     <p:spTree>
       <p:nvGrpSpPr>
@@ -843,6 +883,8 @@
         <a:xfrm>
           <a:off x="0" y="0"/>
           <a:ext cx="0" cy="0"/>
+          <a:chOff x="0" y="0"/>
+          <a:chExt cx="0" cy="0"/>
         </a:xfrm>
       </p:grpSpPr>
       <p:sp>
@@ -865,10 +907,9 @@
           </a:lstStyle>
           <a:p>
             <a:r>
-              <a:rPr lang="en-US" smtClean="0"/>
+              <a:rPr lang="en-US"/>
               <a:t>Click to edit Master title style</a:t>
             </a:r>
-            <a:endParaRPr lang="en-US"/>
           </a:p>
         </p:txBody>
       </p:sp>
@@ -979,7 +1020,7 @@
           </a:lstStyle>
           <a:p>
             <a:r>
-              <a:rPr lang="en-US" smtClean="0"/>
+              <a:rPr lang="en-US"/>
               <a:t>Click to edit Master text styles</a:t>
             </a:r>
           </a:p>
@@ -1002,7 +1043,7 @@
           <a:p>
             <a:fld id="{EE54156C-66BC-458A-9AA1-AE1D799E01C7}" type="datetimeFigureOut">
               <a:rPr lang="en-US" smtClean="0"/>
-              <a:t>11/7/2009</a:t>
+              <a:t>10/19/2020</a:t>
             </a:fld>
             <a:endParaRPr lang="en-US"/>
           </a:p>
@@ -1056,12 +1097,11 @@
     <a:masterClrMapping/>
   </p:clrMapOvr>
   <p:transition/>
-  <p:timing/>
 </p:sldLayout>
 </file>
 
 <file path=ppt/slideLayouts/slideLayout4.xml><?xml version="1.0" encoding="utf-8"?>
-<p:sldLayout xmlns:a="http://schemas.openxmlformats.org/drawingml/2006/main" xmlns:r="http://schemas.openxmlformats.org/officeDocument/2006/relationships" xmlns:p14="http://schemas.microsoft.com/office/powerpoint/2010/main" xmlns:a14="http://schemas.microsoft.com/office/drawing/2010/main" xmlns:p15="http://schemas.microsoft.com/office/powerpoint/2012/main" xmlns:p159="http://schemas.microsoft.com/office/powerpoint/2015/09/main" xmlns:p="http://schemas.openxmlformats.org/presentationml/2006/main" type="twoObj" preserve="1">
+<p:sldLayout xmlns:a="http://schemas.openxmlformats.org/drawingml/2006/main" xmlns:r="http://schemas.openxmlformats.org/officeDocument/2006/relationships" xmlns:p="http://schemas.openxmlformats.org/presentationml/2006/main" type="twoObj" preserve="1">
   <p:cSld name="Two Content">
     <p:spTree>
       <p:nvGrpSpPr>
@@ -1073,6 +1113,8 @@
         <a:xfrm>
           <a:off x="0" y="0"/>
           <a:ext cx="0" cy="0"/>
+          <a:chOff x="0" y="0"/>
+          <a:chExt cx="0" cy="0"/>
         </a:xfrm>
       </p:grpSpPr>
       <p:sp>
@@ -1091,10 +1133,9 @@
           <a:lstStyle/>
           <a:p>
             <a:r>
-              <a:rPr lang="en-US" smtClean="0"/>
+              <a:rPr lang="en-US"/>
               <a:t>Click to edit Master title style</a:t>
             </a:r>
-            <a:endParaRPr lang="en-US"/>
           </a:p>
         </p:txBody>
       </p:sp>
@@ -1142,38 +1183,37 @@
           </a:lstStyle>
           <a:p>
             <a:r>
-              <a:rPr lang="en-US" smtClean="0"/>
+              <a:rPr lang="en-US"/>
               <a:t>Click to edit Master text styles</a:t>
             </a:r>
           </a:p>
           <a:p>
             <a:pPr lvl="1"/>
             <a:r>
-              <a:rPr lang="en-US" smtClean="0"/>
+              <a:rPr lang="en-US"/>
               <a:t>Second level</a:t>
             </a:r>
           </a:p>
           <a:p>
             <a:pPr lvl="2"/>
             <a:r>
-              <a:rPr lang="en-US" smtClean="0"/>
+              <a:rPr lang="en-US"/>
               <a:t>Third level</a:t>
             </a:r>
           </a:p>
           <a:p>
             <a:pPr lvl="3"/>
             <a:r>
-              <a:rPr lang="en-US" smtClean="0"/>
+              <a:rPr lang="en-US"/>
               <a:t>Fourth level</a:t>
             </a:r>
           </a:p>
           <a:p>
             <a:pPr lvl="4"/>
             <a:r>
-              <a:rPr lang="en-US" smtClean="0"/>
+              <a:rPr lang="en-US"/>
               <a:t>Fifth level</a:t>
             </a:r>
-            <a:endParaRPr lang="en-US"/>
           </a:p>
         </p:txBody>
       </p:sp>
@@ -1221,38 +1261,37 @@
           </a:lstStyle>
           <a:p>
             <a:r>
-              <a:rPr lang="en-US" smtClean="0"/>
+              <a:rPr lang="en-US"/>
               <a:t>Click to edit Master text styles</a:t>
             </a:r>
           </a:p>
           <a:p>
             <a:pPr lvl="1"/>
             <a:r>
-              <a:rPr lang="en-US" smtClean="0"/>
+              <a:rPr lang="en-US"/>
               <a:t>Second level</a:t>
             </a:r>
           </a:p>
           <a:p>
             <a:pPr lvl="2"/>
             <a:r>
-              <a:rPr lang="en-US" smtClean="0"/>
+              <a:rPr lang="en-US"/>
               <a:t>Third level</a:t>
             </a:r>
           </a:p>
           <a:p>
             <a:pPr lvl="3"/>
             <a:r>
-              <a:rPr lang="en-US" smtClean="0"/>
+              <a:rPr lang="en-US"/>
               <a:t>Fourth level</a:t>
             </a:r>
           </a:p>
           <a:p>
             <a:pPr lvl="4"/>
             <a:r>
-              <a:rPr lang="en-US" smtClean="0"/>
+              <a:rPr lang="en-US"/>
               <a:t>Fifth level</a:t>
             </a:r>
-            <a:endParaRPr lang="en-US"/>
           </a:p>
         </p:txBody>
       </p:sp>
@@ -1273,7 +1312,7 @@
           <a:p>
             <a:fld id="{6A4EFE15-3051-4660-A8A1-37391752CA51}" type="datetimeFigureOut">
               <a:rPr lang="en-US" smtClean="0"/>
-              <a:t>11/7/2009</a:t>
+              <a:t>10/19/2020</a:t>
             </a:fld>
             <a:endParaRPr lang="en-US"/>
           </a:p>
@@ -1327,12 +1366,11 @@
     <a:masterClrMapping/>
   </p:clrMapOvr>
   <p:transition/>
-  <p:timing/>
 </p:sldLayout>
 </file>
 
 <file path=ppt/slideLayouts/slideLayout5.xml><?xml version="1.0" encoding="utf-8"?>
-<p:sldLayout xmlns:a="http://schemas.openxmlformats.org/drawingml/2006/main" xmlns:r="http://schemas.openxmlformats.org/officeDocument/2006/relationships" xmlns:p14="http://schemas.microsoft.com/office/powerpoint/2010/main" xmlns:a14="http://schemas.microsoft.com/office/drawing/2010/main" xmlns:p15="http://schemas.microsoft.com/office/powerpoint/2012/main" xmlns:p159="http://schemas.microsoft.com/office/powerpoint/2015/09/main" xmlns:p="http://schemas.openxmlformats.org/presentationml/2006/main" type="twoTxTwoObj" preserve="1">
+<p:sldLayout xmlns:a="http://schemas.openxmlformats.org/drawingml/2006/main" xmlns:r="http://schemas.openxmlformats.org/officeDocument/2006/relationships" xmlns:p="http://schemas.openxmlformats.org/presentationml/2006/main" type="twoTxTwoObj" preserve="1">
   <p:cSld name="Comparison">
     <p:spTree>
       <p:nvGrpSpPr>
@@ -1344,6 +1382,8 @@
         <a:xfrm>
           <a:off x="0" y="0"/>
           <a:ext cx="0" cy="0"/>
+          <a:chOff x="0" y="0"/>
+          <a:chExt cx="0" cy="0"/>
         </a:xfrm>
       </p:grpSpPr>
       <p:sp>
@@ -1362,10 +1402,9 @@
           <a:lstStyle/>
           <a:p>
             <a:r>
-              <a:rPr lang="en-US" smtClean="0"/>
+              <a:rPr lang="en-US"/>
               <a:t>Click to edit Master title style</a:t>
             </a:r>
-            <a:endParaRPr lang="en-US"/>
           </a:p>
         </p:txBody>
       </p:sp>
@@ -1422,7 +1461,7 @@
           </a:lstStyle>
           <a:p>
             <a:r>
-              <a:rPr lang="en-US" smtClean="0"/>
+              <a:rPr lang="en-US"/>
               <a:t>Click to edit Master text styles</a:t>
             </a:r>
           </a:p>
@@ -1472,38 +1511,37 @@
           </a:lstStyle>
           <a:p>
             <a:r>
-              <a:rPr lang="en-US" smtClean="0"/>
+              <a:rPr lang="en-US"/>
               <a:t>Click to edit Master text styles</a:t>
             </a:r>
           </a:p>
           <a:p>
             <a:pPr lvl="1"/>
             <a:r>
-              <a:rPr lang="en-US" smtClean="0"/>
+              <a:rPr lang="en-US"/>
               <a:t>Second level</a:t>
             </a:r>
           </a:p>
           <a:p>
             <a:pPr lvl="2"/>
             <a:r>
-              <a:rPr lang="en-US" smtClean="0"/>
+              <a:rPr lang="en-US"/>
               <a:t>Third level</a:t>
             </a:r>
           </a:p>
           <a:p>
             <a:pPr lvl="3"/>
             <a:r>
-              <a:rPr lang="en-US" smtClean="0"/>
+              <a:rPr lang="en-US"/>
               <a:t>Fourth level</a:t>
             </a:r>
           </a:p>
           <a:p>
             <a:pPr lvl="4"/>
             <a:r>
-              <a:rPr lang="en-US" smtClean="0"/>
+              <a:rPr lang="en-US"/>
               <a:t>Fifth level</a:t>
             </a:r>
-            <a:endParaRPr lang="en-US"/>
           </a:p>
         </p:txBody>
       </p:sp>
@@ -1560,7 +1598,7 @@
           </a:lstStyle>
           <a:p>
             <a:r>
-              <a:rPr lang="en-US" smtClean="0"/>
+              <a:rPr lang="en-US"/>
               <a:t>Click to edit Master text styles</a:t>
             </a:r>
           </a:p>
@@ -1610,38 +1648,37 @@
           </a:lstStyle>
           <a:p>
             <a:r>
-              <a:rPr lang="en-US" smtClean="0"/>
+              <a:rPr lang="en-US"/>
               <a:t>Click to edit Master text styles</a:t>
             </a:r>
           </a:p>
           <a:p>
             <a:pPr lvl="1"/>
             <a:r>
-              <a:rPr lang="en-US" smtClean="0"/>
+              <a:rPr lang="en-US"/>
               <a:t>Second level</a:t>
             </a:r>
           </a:p>
           <a:p>
             <a:pPr lvl="2"/>
             <a:r>
-              <a:rPr lang="en-US" smtClean="0"/>
+              <a:rPr lang="en-US"/>
               <a:t>Third level</a:t>
             </a:r>
           </a:p>
           <a:p>
             <a:pPr lvl="3"/>
             <a:r>
-              <a:rPr lang="en-US" smtClean="0"/>
+              <a:rPr lang="en-US"/>
               <a:t>Fourth level</a:t>
             </a:r>
           </a:p>
           <a:p>
             <a:pPr lvl="4"/>
             <a:r>
-              <a:rPr lang="en-US" smtClean="0"/>
+              <a:rPr lang="en-US"/>
               <a:t>Fifth level</a:t>
             </a:r>
-            <a:endParaRPr lang="en-US"/>
           </a:p>
         </p:txBody>
       </p:sp>
@@ -1662,7 +1699,7 @@
           <a:p>
             <a:fld id="{B856589F-8243-47EE-ACC8-480FBBFEFEDA}" type="datetimeFigureOut">
               <a:rPr lang="en-US" smtClean="0"/>
-              <a:t>11/7/2009</a:t>
+              <a:t>10/19/2020</a:t>
             </a:fld>
             <a:endParaRPr lang="en-US"/>
           </a:p>
@@ -1716,12 +1753,11 @@
     <a:masterClrMapping/>
   </p:clrMapOvr>
   <p:transition/>
-  <p:timing/>
 </p:sldLayout>
 </file>
 
 <file path=ppt/slideLayouts/slideLayout6.xml><?xml version="1.0" encoding="utf-8"?>
-<p:sldLayout xmlns:a="http://schemas.openxmlformats.org/drawingml/2006/main" xmlns:r="http://schemas.openxmlformats.org/officeDocument/2006/relationships" xmlns:p14="http://schemas.microsoft.com/office/powerpoint/2010/main" xmlns:a14="http://schemas.microsoft.com/office/drawing/2010/main" xmlns:p15="http://schemas.microsoft.com/office/powerpoint/2012/main" xmlns:p159="http://schemas.microsoft.com/office/powerpoint/2015/09/main" xmlns:p="http://schemas.openxmlformats.org/presentationml/2006/main" type="titleOnly" preserve="1">
+<p:sldLayout xmlns:a="http://schemas.openxmlformats.org/drawingml/2006/main" xmlns:r="http://schemas.openxmlformats.org/officeDocument/2006/relationships" xmlns:p="http://schemas.openxmlformats.org/presentationml/2006/main" type="titleOnly" preserve="1">
   <p:cSld name="Title Only">
     <p:spTree>
       <p:nvGrpSpPr>
@@ -1733,6 +1769,8 @@
         <a:xfrm>
           <a:off x="0" y="0"/>
           <a:ext cx="0" cy="0"/>
+          <a:chOff x="0" y="0"/>
+          <a:chExt cx="0" cy="0"/>
         </a:xfrm>
       </p:grpSpPr>
       <p:sp>
@@ -1751,10 +1789,9 @@
           <a:lstStyle/>
           <a:p>
             <a:r>
-              <a:rPr lang="en-US" smtClean="0"/>
+              <a:rPr lang="en-US"/>
               <a:t>Click to edit Master title style</a:t>
             </a:r>
-            <a:endParaRPr lang="en-US"/>
           </a:p>
         </p:txBody>
       </p:sp>
@@ -1775,7 +1812,7 @@
           <a:p>
             <a:fld id="{94EE65CF-0304-41FA-962A-CDBE0684A51E}" type="datetimeFigureOut">
               <a:rPr lang="en-US" smtClean="0"/>
-              <a:t>11/7/2009</a:t>
+              <a:t>10/19/2020</a:t>
             </a:fld>
             <a:endParaRPr lang="en-US"/>
           </a:p>
@@ -1829,12 +1866,11 @@
     <a:masterClrMapping/>
   </p:clrMapOvr>
   <p:transition/>
-  <p:timing/>
 </p:sldLayout>
 </file>
 
 <file path=ppt/slideLayouts/slideLayout7.xml><?xml version="1.0" encoding="utf-8"?>
-<p:sldLayout xmlns:a="http://schemas.openxmlformats.org/drawingml/2006/main" xmlns:r="http://schemas.openxmlformats.org/officeDocument/2006/relationships" xmlns:p14="http://schemas.microsoft.com/office/powerpoint/2010/main" xmlns:a14="http://schemas.microsoft.com/office/drawing/2010/main" xmlns:p15="http://schemas.microsoft.com/office/powerpoint/2012/main" xmlns:p159="http://schemas.microsoft.com/office/powerpoint/2015/09/main" xmlns:p="http://schemas.openxmlformats.org/presentationml/2006/main" type="blank" preserve="1">
+<p:sldLayout xmlns:a="http://schemas.openxmlformats.org/drawingml/2006/main" xmlns:r="http://schemas.openxmlformats.org/officeDocument/2006/relationships" xmlns:p="http://schemas.openxmlformats.org/presentationml/2006/main" type="blank" preserve="1">
   <p:cSld name="Blank">
     <p:spTree>
       <p:nvGrpSpPr>
@@ -1846,6 +1882,8 @@
         <a:xfrm>
           <a:off x="0" y="0"/>
           <a:ext cx="0" cy="0"/>
+          <a:chOff x="0" y="0"/>
+          <a:chExt cx="0" cy="0"/>
         </a:xfrm>
       </p:grpSpPr>
       <p:sp>
@@ -1865,7 +1903,7 @@
           <a:p>
             <a:fld id="{E780122C-8871-4669-B8AA-3F77C1FD66DD}" type="datetimeFigureOut">
               <a:rPr lang="en-US" smtClean="0"/>
-              <a:t>11/7/2009</a:t>
+              <a:t>10/19/2020</a:t>
             </a:fld>
             <a:endParaRPr lang="en-US"/>
           </a:p>
@@ -1919,12 +1957,11 @@
     <a:masterClrMapping/>
   </p:clrMapOvr>
   <p:transition/>
-  <p:timing/>
 </p:sldLayout>
 </file>
 
 <file path=ppt/slideLayouts/slideLayout8.xml><?xml version="1.0" encoding="utf-8"?>
-<p:sldLayout xmlns:a="http://schemas.openxmlformats.org/drawingml/2006/main" xmlns:r="http://schemas.openxmlformats.org/officeDocument/2006/relationships" xmlns:p14="http://schemas.microsoft.com/office/powerpoint/2010/main" xmlns:a14="http://schemas.microsoft.com/office/drawing/2010/main" xmlns:p15="http://schemas.microsoft.com/office/powerpoint/2012/main" xmlns:p159="http://schemas.microsoft.com/office/powerpoint/2015/09/main" xmlns:p="http://schemas.openxmlformats.org/presentationml/2006/main" type="objTx" preserve="1">
+<p:sldLayout xmlns:a="http://schemas.openxmlformats.org/drawingml/2006/main" xmlns:r="http://schemas.openxmlformats.org/officeDocument/2006/relationships" xmlns:p="http://schemas.openxmlformats.org/presentationml/2006/main" type="objTx" preserve="1">
   <p:cSld name="Content with Caption">
     <p:spTree>
       <p:nvGrpSpPr>
@@ -1936,6 +1973,8 @@
         <a:xfrm>
           <a:off x="0" y="0"/>
           <a:ext cx="0" cy="0"/>
+          <a:chOff x="0" y="0"/>
+          <a:chExt cx="0" cy="0"/>
         </a:xfrm>
       </p:grpSpPr>
       <p:sp>
@@ -1958,10 +1997,9 @@
           </a:lstStyle>
           <a:p>
             <a:r>
-              <a:rPr lang="en-US" smtClean="0"/>
+              <a:rPr lang="en-US"/>
               <a:t>Click to edit Master title style</a:t>
             </a:r>
-            <a:endParaRPr lang="en-US"/>
           </a:p>
         </p:txBody>
       </p:sp>
@@ -2009,38 +2047,37 @@
           </a:lstStyle>
           <a:p>
             <a:r>
-              <a:rPr lang="en-US" smtClean="0"/>
+              <a:rPr lang="en-US"/>
               <a:t>Click to edit Master text styles</a:t>
             </a:r>
           </a:p>
           <a:p>
             <a:pPr lvl="1"/>
             <a:r>
-              <a:rPr lang="en-US" smtClean="0"/>
+              <a:rPr lang="en-US"/>
               <a:t>Second level</a:t>
             </a:r>
           </a:p>
           <a:p>
             <a:pPr lvl="2"/>
             <a:r>
-              <a:rPr lang="en-US" smtClean="0"/>
+              <a:rPr lang="en-US"/>
               <a:t>Third level</a:t>
             </a:r>
           </a:p>
           <a:p>
             <a:pPr lvl="3"/>
             <a:r>
-              <a:rPr lang="en-US" smtClean="0"/>
+              <a:rPr lang="en-US"/>
               <a:t>Fourth level</a:t>
             </a:r>
           </a:p>
           <a:p>
             <a:pPr lvl="4"/>
             <a:r>
-              <a:rPr lang="en-US" smtClean="0"/>
+              <a:rPr lang="en-US"/>
               <a:t>Fifth level</a:t>
             </a:r>
-            <a:endParaRPr lang="en-US"/>
           </a:p>
         </p:txBody>
       </p:sp>
@@ -2097,7 +2134,7 @@
           </a:lstStyle>
           <a:p>
             <a:r>
-              <a:rPr lang="en-US" smtClean="0"/>
+              <a:rPr lang="en-US"/>
               <a:t>Click to edit Master text styles</a:t>
             </a:r>
           </a:p>
@@ -2120,7 +2157,7 @@
           <a:p>
             <a:fld id="{8AA904E0-4E2F-47D3-B392-630FC7061B66}" type="datetimeFigureOut">
               <a:rPr lang="en-US" smtClean="0"/>
-              <a:t>11/7/2009</a:t>
+              <a:t>10/19/2020</a:t>
             </a:fld>
             <a:endParaRPr lang="en-US"/>
           </a:p>
@@ -2174,12 +2211,11 @@
     <a:masterClrMapping/>
   </p:clrMapOvr>
   <p:transition/>
-  <p:timing/>
 </p:sldLayout>
 </file>
 
 <file path=ppt/slideLayouts/slideLayout9.xml><?xml version="1.0" encoding="utf-8"?>
-<p:sldLayout xmlns:a="http://schemas.openxmlformats.org/drawingml/2006/main" xmlns:r="http://schemas.openxmlformats.org/officeDocument/2006/relationships" xmlns:p14="http://schemas.microsoft.com/office/powerpoint/2010/main" xmlns:a14="http://schemas.microsoft.com/office/drawing/2010/main" xmlns:p15="http://schemas.microsoft.com/office/powerpoint/2012/main" xmlns:p159="http://schemas.microsoft.com/office/powerpoint/2015/09/main" xmlns:p="http://schemas.openxmlformats.org/presentationml/2006/main" type="picTx" preserve="1">
+<p:sldLayout xmlns:a="http://schemas.openxmlformats.org/drawingml/2006/main" xmlns:r="http://schemas.openxmlformats.org/officeDocument/2006/relationships" xmlns:p="http://schemas.openxmlformats.org/presentationml/2006/main" type="picTx" preserve="1">
   <p:cSld name="Picture with Caption">
     <p:spTree>
       <p:nvGrpSpPr>
@@ -2191,6 +2227,8 @@
         <a:xfrm>
           <a:off x="0" y="0"/>
           <a:ext cx="0" cy="0"/>
+          <a:chOff x="0" y="0"/>
+          <a:chExt cx="0" cy="0"/>
         </a:xfrm>
       </p:grpSpPr>
       <p:sp>
@@ -2213,10 +2251,9 @@
           </a:lstStyle>
           <a:p>
             <a:r>
-              <a:rPr lang="en-US" smtClean="0"/>
+              <a:rPr lang="en-US"/>
               <a:t>Click to edit Master title style</a:t>
             </a:r>
-            <a:endParaRPr lang="en-US"/>
           </a:p>
         </p:txBody>
       </p:sp>
@@ -2329,7 +2366,7 @@
           </a:lstStyle>
           <a:p>
             <a:r>
-              <a:rPr lang="en-US" smtClean="0"/>
+              <a:rPr lang="en-US"/>
               <a:t>Click to edit Master text styles</a:t>
             </a:r>
           </a:p>
@@ -2352,7 +2389,7 @@
           <a:p>
             <a:fld id="{34A33F24-EB7B-4BEC-93FD-D717E7C8581D}" type="datetimeFigureOut">
               <a:rPr lang="en-US" smtClean="0"/>
-              <a:t>11/7/2009</a:t>
+              <a:t>10/19/2020</a:t>
             </a:fld>
             <a:endParaRPr lang="en-US"/>
           </a:p>
@@ -2406,12 +2443,11 @@
     <a:masterClrMapping/>
   </p:clrMapOvr>
   <p:transition/>
-  <p:timing/>
 </p:sldLayout>
 </file>
 
 <file path=ppt/slideMasters/slideMaster1.xml><?xml version="1.0" encoding="utf-8"?>
-<p:sldMaster xmlns:a="http://schemas.openxmlformats.org/drawingml/2006/main" xmlns:r="http://schemas.openxmlformats.org/officeDocument/2006/relationships" xmlns:p14="http://schemas.microsoft.com/office/powerpoint/2010/main" xmlns:a14="http://schemas.microsoft.com/office/drawing/2010/main" xmlns:p15="http://schemas.microsoft.com/office/powerpoint/2012/main" xmlns:p159="http://schemas.microsoft.com/office/powerpoint/2015/09/main" xmlns:p="http://schemas.openxmlformats.org/presentationml/2006/main">
+<p:sldMaster xmlns:a="http://schemas.openxmlformats.org/drawingml/2006/main" xmlns:r="http://schemas.openxmlformats.org/officeDocument/2006/relationships" xmlns:p="http://schemas.openxmlformats.org/presentationml/2006/main">
   <p:cSld>
     <p:bg>
       <p:bgRef idx="1001">
@@ -2428,6 +2464,8 @@
         <a:xfrm>
           <a:off x="0" y="0"/>
           <a:ext cx="0" cy="0"/>
+          <a:chOff x="0" y="0"/>
+          <a:chExt cx="0" cy="0"/>
         </a:xfrm>
       </p:grpSpPr>
       <p:sp>
@@ -2456,10 +2494,9 @@
           <a:lstStyle/>
           <a:p>
             <a:r>
-              <a:rPr lang="en-US" smtClean="0"/>
+              <a:rPr lang="en-US"/>
               <a:t>Click to edit Master title style</a:t>
             </a:r>
-            <a:endParaRPr lang="en-US"/>
           </a:p>
         </p:txBody>
       </p:sp>
@@ -2489,38 +2526,37 @@
           <a:lstStyle/>
           <a:p>
             <a:r>
-              <a:rPr lang="en-US" smtClean="0"/>
+              <a:rPr lang="en-US"/>
               <a:t>Click to edit Master text styles</a:t>
             </a:r>
           </a:p>
           <a:p>
             <a:pPr lvl="1"/>
             <a:r>
-              <a:rPr lang="en-US" smtClean="0"/>
+              <a:rPr lang="en-US"/>
               <a:t>Second level</a:t>
             </a:r>
           </a:p>
           <a:p>
             <a:pPr lvl="2"/>
             <a:r>
-              <a:rPr lang="en-US" smtClean="0"/>
+              <a:rPr lang="en-US"/>
               <a:t>Third level</a:t>
             </a:r>
           </a:p>
           <a:p>
             <a:pPr lvl="3"/>
             <a:r>
-              <a:rPr lang="en-US" smtClean="0"/>
+              <a:rPr lang="en-US"/>
               <a:t>Fourth level</a:t>
             </a:r>
           </a:p>
           <a:p>
             <a:pPr lvl="4"/>
             <a:r>
-              <a:rPr lang="en-US" smtClean="0"/>
+              <a:rPr lang="en-US"/>
               <a:t>Fifth level</a:t>
             </a:r>
-            <a:endParaRPr lang="en-US"/>
           </a:p>
         </p:txBody>
       </p:sp>
@@ -2559,7 +2595,7 @@
           <a:p>
             <a:fld id="{E8FD0B7A-F5DD-4F40-B4CB-3B2C354B893A}" type="datetimeFigureOut">
               <a:rPr lang="en-US" smtClean="0"/>
-              <a:t>11/7/2009</a:t>
+              <a:t>10/19/2020</a:t>
             </a:fld>
             <a:endParaRPr lang="en-US"/>
           </a:p>
@@ -2660,7 +2696,6 @@
     <p:sldLayoutId id="2147483659" r:id="rId11"/>
   </p:sldLayoutIdLst>
   <p:transition/>
-  <p:timing/>
   <p:txStyles>
     <p:titleStyle>
       <a:lvl1pPr algn="ctr" defTabSz="914400" rtl="0" eaLnBrk="1" latinLnBrk="0" hangingPunct="1">
@@ -2915,8 +2950,8 @@
 </file>
 
 <file path=ppt/slides/slide1.xml><?xml version="1.0" encoding="utf-8"?>
-<p:sld xmlns:a="http://schemas.openxmlformats.org/drawingml/2006/main" xmlns:r="http://schemas.openxmlformats.org/officeDocument/2006/relationships" xmlns:p14="http://schemas.microsoft.com/office/powerpoint/2010/main" xmlns:a14="http://schemas.microsoft.com/office/drawing/2010/main" xmlns:p15="http://schemas.microsoft.com/office/powerpoint/2012/main" xmlns:p159="http://schemas.microsoft.com/office/powerpoint/2015/09/main" xmlns:p="http://schemas.openxmlformats.org/presentationml/2006/main">
-  <p:cSld name="">
+<p:sld xmlns:a="http://schemas.openxmlformats.org/drawingml/2006/main" xmlns:r="http://schemas.openxmlformats.org/officeDocument/2006/relationships" xmlns:p="http://schemas.openxmlformats.org/presentationml/2006/main">
+  <p:cSld>
     <p:spTree>
       <p:nvGrpSpPr>
         <p:cNvPr id="1" name=""/>
@@ -2927,6 +2962,8 @@
         <a:xfrm>
           <a:off x="0" y="0"/>
           <a:ext cx="0" cy="0"/>
+          <a:chOff x="0" y="0"/>
+          <a:chExt cx="0" cy="0"/>
         </a:xfrm>
       </p:grpSpPr>
       <p:pic>
@@ -2944,7 +2981,7 @@
         <p:spPr>
           <a:xfrm>
             <a:off x="0" y="0"/>
-            <a:ext cx="6096000" cy="6096000"/>
+            <a:ext cx="3707904" cy="1124744"/>
           </a:xfrm>
           <a:prstGeom prst="rect">
             <a:avLst/>
@@ -2957,12 +2994,11 @@
     <a:masterClrMapping/>
   </p:clrMapOvr>
   <p:transition/>
-  <p:timing/>
 </p:sld>
 </file>
 
 <file path=ppt/tags/tag1.xml><?xml version="1.0" encoding="utf-8"?>
-<p:tagLst xmlns:p="http://schemas.openxmlformats.org/presentationml/2006/main">
+<p:tagLst xmlns:a="http://schemas.openxmlformats.org/drawingml/2006/main" xmlns:r="http://schemas.openxmlformats.org/officeDocument/2006/relationships" xmlns:p="http://schemas.openxmlformats.org/presentationml/2006/main">
   <p:tag name="AS_NET" val="4.0.30319.42000"/>
   <p:tag name="AS_OS" val="Microsoft Windows NT 6.2.9200.0"/>
   <p:tag name="AS_RELEASE_DATE" val="2019.06.14"/>
@@ -2972,7 +3008,7 @@
 </file>
 
 <file path=ppt/theme/theme1.xml><?xml version="1.0" encoding="utf-8"?>
-<a:theme xmlns:r="http://schemas.openxmlformats.org/officeDocument/2006/relationships" xmlns:a="http://schemas.openxmlformats.org/drawingml/2006/main" name="Office Theme">
+<a:theme xmlns:a="http://schemas.openxmlformats.org/drawingml/2006/main" name="Office Theme">
   <a:themeElements>
     <a:clrScheme name="Office">
       <a:dk1>
@@ -3251,5 +3287,7 @@
       </a:bgFillStyleLst>
     </a:fmtScheme>
   </a:themeElements>
+  <a:objectDefaults/>
+  <a:extraClrSchemeLst/>
 </a:theme>
 </file>
</xml_diff>